<commit_message>
Append the requirement for inscript on university project
</commit_message>
<xml_diff>
--- a/WebLecture/Lecture15-Javascript6.pptx
+++ b/WebLecture/Lecture15-Javascript6.pptx
@@ -223,7 +223,7 @@
             <a:fld id="{8BEFEC64-3B02-48AC-B709-B2823D518D38}" type="datetimeFigureOut">
               <a:rPr lang="zh-CN" altLang="en-US" smtClean="0"/>
               <a:pPr/>
-              <a:t>2022/3/19</a:t>
+              <a:t>2022/8/21</a:t>
             </a:fld>
             <a:endParaRPr lang="zh-CN" altLang="en-US" dirty="0"/>
           </a:p>
@@ -624,7 +624,7 @@
           <a:p>
             <a:fld id="{82F288E0-7875-42C4-84C8-98DBBD3BF4D2}" type="datetimeFigureOut">
               <a:rPr lang="zh-CN" altLang="en-US" smtClean="0"/>
-              <a:t>2022/3/19</a:t>
+              <a:t>2022/8/21</a:t>
             </a:fld>
             <a:endParaRPr lang="zh-CN" altLang="en-US"/>
           </a:p>
@@ -770,7 +770,7 @@
           <a:p>
             <a:fld id="{82F288E0-7875-42C4-84C8-98DBBD3BF4D2}" type="datetimeFigureOut">
               <a:rPr lang="zh-CN" altLang="en-US" smtClean="0"/>
-              <a:t>2022/3/19</a:t>
+              <a:t>2022/8/21</a:t>
             </a:fld>
             <a:endParaRPr lang="zh-CN" altLang="en-US"/>
           </a:p>
@@ -933,7 +933,7 @@
           <a:p>
             <a:fld id="{82F288E0-7875-42C4-84C8-98DBBD3BF4D2}" type="datetimeFigureOut">
               <a:rPr lang="zh-CN" altLang="en-US" smtClean="0"/>
-              <a:t>2022/3/19</a:t>
+              <a:t>2022/8/21</a:t>
             </a:fld>
             <a:endParaRPr lang="zh-CN" altLang="en-US"/>
           </a:p>
@@ -1173,7 +1173,7 @@
           <a:p>
             <a:fld id="{82F288E0-7875-42C4-84C8-98DBBD3BF4D2}" type="datetimeFigureOut">
               <a:rPr lang="zh-CN" altLang="en-US" smtClean="0"/>
-              <a:t>2022/3/19</a:t>
+              <a:t>2022/8/21</a:t>
             </a:fld>
             <a:endParaRPr lang="zh-CN" altLang="en-US"/>
           </a:p>
@@ -1397,7 +1397,7 @@
           <a:p>
             <a:fld id="{82F288E0-7875-42C4-84C8-98DBBD3BF4D2}" type="datetimeFigureOut">
               <a:rPr lang="zh-CN" altLang="en-US" smtClean="0"/>
-              <a:t>2022/3/19</a:t>
+              <a:t>2022/8/21</a:t>
             </a:fld>
             <a:endParaRPr lang="zh-CN" altLang="en-US"/>
           </a:p>
@@ -1756,7 +1756,7 @@
           <a:p>
             <a:fld id="{82F288E0-7875-42C4-84C8-98DBBD3BF4D2}" type="datetimeFigureOut">
               <a:rPr lang="zh-CN" altLang="en-US" smtClean="0"/>
-              <a:t>2022/3/19</a:t>
+              <a:t>2022/8/21</a:t>
             </a:fld>
             <a:endParaRPr lang="zh-CN" altLang="en-US"/>
           </a:p>
@@ -1868,7 +1868,7 @@
           <a:p>
             <a:fld id="{82F288E0-7875-42C4-84C8-98DBBD3BF4D2}" type="datetimeFigureOut">
               <a:rPr lang="zh-CN" altLang="en-US" smtClean="0"/>
-              <a:t>2022/3/19</a:t>
+              <a:t>2022/8/21</a:t>
             </a:fld>
             <a:endParaRPr lang="zh-CN" altLang="en-US"/>
           </a:p>
@@ -1958,7 +1958,7 @@
           <a:p>
             <a:fld id="{82F288E0-7875-42C4-84C8-98DBBD3BF4D2}" type="datetimeFigureOut">
               <a:rPr lang="zh-CN" altLang="en-US" smtClean="0"/>
-              <a:t>2022/3/19</a:t>
+              <a:t>2022/8/21</a:t>
             </a:fld>
             <a:endParaRPr lang="zh-CN" altLang="en-US"/>
           </a:p>
@@ -2205,7 +2205,7 @@
           <a:p>
             <a:fld id="{82F288E0-7875-42C4-84C8-98DBBD3BF4D2}" type="datetimeFigureOut">
               <a:rPr lang="zh-CN" altLang="en-US" smtClean="0"/>
-              <a:t>2022/3/19</a:t>
+              <a:t>2022/8/21</a:t>
             </a:fld>
             <a:endParaRPr lang="zh-CN" altLang="en-US"/>
           </a:p>
@@ -2378,7 +2378,7 @@
           <a:p>
             <a:fld id="{82F288E0-7875-42C4-84C8-98DBBD3BF4D2}" type="datetimeFigureOut">
               <a:rPr lang="zh-CN" altLang="en-US" smtClean="0"/>
-              <a:t>2022/3/19</a:t>
+              <a:t>2022/8/21</a:t>
             </a:fld>
             <a:endParaRPr lang="zh-CN" altLang="en-US"/>
           </a:p>
@@ -2592,7 +2592,7 @@
             <a:fld id="{82F288E0-7875-42C4-84C8-98DBBD3BF4D2}" type="datetimeFigureOut">
               <a:rPr lang="zh-CN" altLang="en-US" smtClean="0"/>
               <a:pPr/>
-              <a:t>2022/3/19</a:t>
+              <a:t>2022/8/21</a:t>
             </a:fld>
             <a:endParaRPr lang="zh-CN" altLang="en-US" dirty="0"/>
           </a:p>

</xml_diff>